<commit_message>
release bayOmicsLib-1.5.6 and add TC diagnostic test
</commit_message>
<xml_diff>
--- a/oem_projects/bayOmics/BayOmics培训文档.pptx
+++ b/oem_projects/bayOmics/BayOmics培训文档.pptx
@@ -24,7 +24,8 @@
     <p:sldId id="271" r:id="rId18"/>
     <p:sldId id="272" r:id="rId19"/>
     <p:sldId id="273" r:id="rId20"/>
-    <p:sldId id="274" r:id="rId21"/>
+    <p:sldId id="276" r:id="rId21"/>
+    <p:sldId id="274" r:id="rId22"/>
   </p:sldIdLst>
   <p:sldSz cx="12192000" cy="6858000"/>
   <p:notesSz cx="6858000" cy="9144000"/>
@@ -286,7 +287,7 @@
           <a:p>
             <a:fld id="{ECAD4D6A-33F2-4785-80A1-C44D85522821}" type="datetimeFigureOut">
               <a:rPr lang="zh-CN" altLang="en-US" smtClean="0"/>
-              <a:t>2024/8/28</a:t>
+              <a:t>2024/9/4</a:t>
             </a:fld>
             <a:endParaRPr lang="zh-CN" altLang="en-US"/>
           </a:p>
@@ -484,7 +485,7 @@
           <a:p>
             <a:fld id="{ECAD4D6A-33F2-4785-80A1-C44D85522821}" type="datetimeFigureOut">
               <a:rPr lang="zh-CN" altLang="en-US" smtClean="0"/>
-              <a:t>2024/8/28</a:t>
+              <a:t>2024/9/4</a:t>
             </a:fld>
             <a:endParaRPr lang="zh-CN" altLang="en-US"/>
           </a:p>
@@ -692,7 +693,7 @@
           <a:p>
             <a:fld id="{ECAD4D6A-33F2-4785-80A1-C44D85522821}" type="datetimeFigureOut">
               <a:rPr lang="zh-CN" altLang="en-US" smtClean="0"/>
-              <a:t>2024/8/28</a:t>
+              <a:t>2024/9/4</a:t>
             </a:fld>
             <a:endParaRPr lang="zh-CN" altLang="en-US"/>
           </a:p>
@@ -890,7 +891,7 @@
           <a:p>
             <a:fld id="{ECAD4D6A-33F2-4785-80A1-C44D85522821}" type="datetimeFigureOut">
               <a:rPr lang="zh-CN" altLang="en-US" smtClean="0"/>
-              <a:t>2024/8/28</a:t>
+              <a:t>2024/9/4</a:t>
             </a:fld>
             <a:endParaRPr lang="zh-CN" altLang="en-US"/>
           </a:p>
@@ -1165,7 +1166,7 @@
           <a:p>
             <a:fld id="{ECAD4D6A-33F2-4785-80A1-C44D85522821}" type="datetimeFigureOut">
               <a:rPr lang="zh-CN" altLang="en-US" smtClean="0"/>
-              <a:t>2024/8/28</a:t>
+              <a:t>2024/9/4</a:t>
             </a:fld>
             <a:endParaRPr lang="zh-CN" altLang="en-US"/>
           </a:p>
@@ -1430,7 +1431,7 @@
           <a:p>
             <a:fld id="{ECAD4D6A-33F2-4785-80A1-C44D85522821}" type="datetimeFigureOut">
               <a:rPr lang="zh-CN" altLang="en-US" smtClean="0"/>
-              <a:t>2024/8/28</a:t>
+              <a:t>2024/9/4</a:t>
             </a:fld>
             <a:endParaRPr lang="zh-CN" altLang="en-US"/>
           </a:p>
@@ -1842,7 +1843,7 @@
           <a:p>
             <a:fld id="{ECAD4D6A-33F2-4785-80A1-C44D85522821}" type="datetimeFigureOut">
               <a:rPr lang="zh-CN" altLang="en-US" smtClean="0"/>
-              <a:t>2024/8/28</a:t>
+              <a:t>2024/9/4</a:t>
             </a:fld>
             <a:endParaRPr lang="zh-CN" altLang="en-US"/>
           </a:p>
@@ -1983,7 +1984,7 @@
           <a:p>
             <a:fld id="{ECAD4D6A-33F2-4785-80A1-C44D85522821}" type="datetimeFigureOut">
               <a:rPr lang="zh-CN" altLang="en-US" smtClean="0"/>
-              <a:t>2024/8/28</a:t>
+              <a:t>2024/9/4</a:t>
             </a:fld>
             <a:endParaRPr lang="zh-CN" altLang="en-US"/>
           </a:p>
@@ -2096,7 +2097,7 @@
           <a:p>
             <a:fld id="{ECAD4D6A-33F2-4785-80A1-C44D85522821}" type="datetimeFigureOut">
               <a:rPr lang="zh-CN" altLang="en-US" smtClean="0"/>
-              <a:t>2024/8/28</a:t>
+              <a:t>2024/9/4</a:t>
             </a:fld>
             <a:endParaRPr lang="zh-CN" altLang="en-US"/>
           </a:p>
@@ -2407,7 +2408,7 @@
           <a:p>
             <a:fld id="{ECAD4D6A-33F2-4785-80A1-C44D85522821}" type="datetimeFigureOut">
               <a:rPr lang="zh-CN" altLang="en-US" smtClean="0"/>
-              <a:t>2024/8/28</a:t>
+              <a:t>2024/9/4</a:t>
             </a:fld>
             <a:endParaRPr lang="zh-CN" altLang="en-US"/>
           </a:p>
@@ -2695,7 +2696,7 @@
           <a:p>
             <a:fld id="{ECAD4D6A-33F2-4785-80A1-C44D85522821}" type="datetimeFigureOut">
               <a:rPr lang="zh-CN" altLang="en-US" smtClean="0"/>
-              <a:t>2024/8/28</a:t>
+              <a:t>2024/9/4</a:t>
             </a:fld>
             <a:endParaRPr lang="zh-CN" altLang="en-US"/>
           </a:p>
@@ -2936,7 +2937,7 @@
           <a:p>
             <a:fld id="{ECAD4D6A-33F2-4785-80A1-C44D85522821}" type="datetimeFigureOut">
               <a:rPr lang="zh-CN" altLang="en-US" smtClean="0"/>
-              <a:t>2024/8/28</a:t>
+              <a:t>2024/9/4</a:t>
             </a:fld>
             <a:endParaRPr lang="zh-CN" altLang="en-US"/>
           </a:p>
@@ -5213,6 +5214,240 @@
 </file>
 
 <file path=ppt/slides/slide20.xml><?xml version="1.0" encoding="utf-8"?>
+<p:sld xmlns:a="http://schemas.openxmlformats.org/drawingml/2006/main" xmlns:r="http://schemas.openxmlformats.org/officeDocument/2006/relationships" xmlns:p="http://schemas.openxmlformats.org/presentationml/2006/main">
+  <p:cSld>
+    <p:spTree>
+      <p:nvGrpSpPr>
+        <p:cNvPr id="1" name=""/>
+        <p:cNvGrpSpPr/>
+        <p:nvPr/>
+      </p:nvGrpSpPr>
+      <p:grpSpPr>
+        <a:xfrm>
+          <a:off x="0" y="0"/>
+          <a:ext cx="0" cy="0"/>
+          <a:chOff x="0" y="0"/>
+          <a:chExt cx="0" cy="0"/>
+        </a:xfrm>
+      </p:grpSpPr>
+      <p:sp>
+        <p:nvSpPr>
+          <p:cNvPr id="2" name="标题 1">
+            <a:extLst>
+              <a:ext uri="{FF2B5EF4-FFF2-40B4-BE49-F238E27FC236}">
+                <a16:creationId xmlns:a16="http://schemas.microsoft.com/office/drawing/2014/main" id="{6EDA6DDC-44F9-109F-B54D-7349911FFDEC}"/>
+              </a:ext>
+            </a:extLst>
+          </p:cNvPr>
+          <p:cNvSpPr>
+            <a:spLocks noGrp="1"/>
+          </p:cNvSpPr>
+          <p:nvPr>
+            <p:ph type="title"/>
+          </p:nvPr>
+        </p:nvSpPr>
+        <p:spPr/>
+        <p:txBody>
+          <a:bodyPr/>
+          <a:lstStyle/>
+          <a:p>
+            <a:r>
+              <a:rPr lang="zh-CN" altLang="en-US" dirty="0"/>
+              <a:t>上传</a:t>
+            </a:r>
+            <a:r>
+              <a:rPr lang="en-US" altLang="zh-CN" dirty="0"/>
+              <a:t>pressure</a:t>
+            </a:r>
+            <a:r>
+              <a:rPr lang="zh-CN" altLang="en-US" dirty="0"/>
+              <a:t>配置</a:t>
+            </a:r>
+          </a:p>
+        </p:txBody>
+      </p:sp>
+      <p:sp>
+        <p:nvSpPr>
+          <p:cNvPr id="3" name="内容占位符 2">
+            <a:extLst>
+              <a:ext uri="{FF2B5EF4-FFF2-40B4-BE49-F238E27FC236}">
+                <a16:creationId xmlns:a16="http://schemas.microsoft.com/office/drawing/2014/main" id="{26375593-66CE-2D79-3EB6-2550A123400C}"/>
+              </a:ext>
+            </a:extLst>
+          </p:cNvPr>
+          <p:cNvSpPr>
+            <a:spLocks noGrp="1"/>
+          </p:cNvSpPr>
+          <p:nvPr>
+            <p:ph idx="1"/>
+          </p:nvPr>
+        </p:nvSpPr>
+        <p:spPr/>
+        <p:txBody>
+          <a:bodyPr/>
+          <a:lstStyle/>
+          <a:p>
+            <a:r>
+              <a:rPr lang="en-US" altLang="zh-CN" dirty="0"/>
+              <a:t> </a:t>
+            </a:r>
+            <a:r>
+              <a:rPr lang="en-US" altLang="zh-CN" dirty="0" err="1"/>
+              <a:t>scp</a:t>
+            </a:r>
+            <a:r>
+              <a:rPr lang="en-US" altLang="zh-CN" dirty="0"/>
+              <a:t> -</a:t>
+            </a:r>
+            <a:r>
+              <a:rPr lang="en-US" altLang="zh-CN" dirty="0" err="1"/>
+              <a:t>i</a:t>
+            </a:r>
+            <a:r>
+              <a:rPr lang="en-US" altLang="zh-CN" dirty="0"/>
+              <a:t> </a:t>
+            </a:r>
+            <a:r>
+              <a:rPr lang="en-US" altLang="zh-CN" dirty="0">
+                <a:highlight>
+                  <a:srgbClr val="008000"/>
+                </a:highlight>
+              </a:rPr>
+              <a:t>C:\Users\22192\.ssh\ot2_ssh_key </a:t>
+            </a:r>
+            <a:r>
+              <a:rPr lang="en-US" altLang="zh-CN" dirty="0">
+                <a:highlight>
+                  <a:srgbClr val="800080"/>
+                </a:highlight>
+              </a:rPr>
+              <a:t>.\</a:t>
+            </a:r>
+            <a:r>
+              <a:rPr lang="en-US" altLang="zh-CN" dirty="0" err="1">
+                <a:highlight>
+                  <a:srgbClr val="800080"/>
+                </a:highlight>
+              </a:rPr>
+              <a:t>user_pressure.json</a:t>
+            </a:r>
+            <a:r>
+              <a:rPr lang="en-US" altLang="zh-CN" dirty="0">
+                <a:highlight>
+                  <a:srgbClr val="800080"/>
+                </a:highlight>
+              </a:rPr>
+              <a:t> </a:t>
+            </a:r>
+            <a:r>
+              <a:rPr lang="en-US" altLang="zh-CN" dirty="0">
+                <a:hlinkClick r:id="rId2"/>
+              </a:rPr>
+              <a:t>root@</a:t>
+            </a:r>
+            <a:r>
+              <a:rPr lang="en-US" altLang="zh-CN" dirty="0">
+                <a:highlight>
+                  <a:srgbClr val="808000"/>
+                </a:highlight>
+                <a:hlinkClick r:id="rId2"/>
+              </a:rPr>
+              <a:t>192.168.8.124</a:t>
+            </a:r>
+            <a:r>
+              <a:rPr lang="en-US" altLang="zh-CN" dirty="0">
+                <a:hlinkClick r:id="rId2"/>
+              </a:rPr>
+              <a:t>:/data/</a:t>
+            </a:r>
+            <a:r>
+              <a:rPr lang="en-US" altLang="zh-CN" dirty="0" err="1">
+                <a:hlinkClick r:id="rId2"/>
+              </a:rPr>
+              <a:t>testing_data</a:t>
+            </a:r>
+            <a:endParaRPr lang="en-US" altLang="zh-CN" dirty="0"/>
+          </a:p>
+          <a:p>
+            <a:endParaRPr lang="en-US" altLang="zh-CN" dirty="0"/>
+          </a:p>
+          <a:p>
+            <a:r>
+              <a:rPr lang="en-US" altLang="zh-CN" dirty="0"/>
+              <a:t>C:\Users\22192\.ssh\ot2_ssh_key –</a:t>
+            </a:r>
+            <a:r>
+              <a:rPr lang="zh-CN" altLang="en-US" dirty="0"/>
+              <a:t>是连接的密钥真实目录</a:t>
+            </a:r>
+            <a:endParaRPr lang="en-US" altLang="zh-CN" dirty="0"/>
+          </a:p>
+          <a:p>
+            <a:r>
+              <a:rPr lang="en-US" altLang="zh-CN" dirty="0"/>
+              <a:t>.\</a:t>
+            </a:r>
+            <a:r>
+              <a:rPr lang="en-US" altLang="zh-CN" dirty="0" err="1"/>
+              <a:t>user_pressure.json</a:t>
+            </a:r>
+            <a:r>
+              <a:rPr lang="en-US" altLang="zh-CN" dirty="0"/>
+              <a:t> – </a:t>
+            </a:r>
+            <a:r>
+              <a:rPr lang="zh-CN" altLang="en-US" dirty="0"/>
+              <a:t>是配置文件的目录</a:t>
+            </a:r>
+            <a:endParaRPr lang="en-US" altLang="zh-CN" dirty="0"/>
+          </a:p>
+          <a:p>
+            <a:r>
+              <a:rPr lang="en-US" altLang="zh-CN" dirty="0">
+                <a:hlinkClick r:id="rId2"/>
+              </a:rPr>
+              <a:t>192.168.8.124</a:t>
+            </a:r>
+            <a:r>
+              <a:rPr lang="en-US" altLang="zh-CN" dirty="0"/>
+              <a:t> – </a:t>
+            </a:r>
+            <a:r>
+              <a:rPr lang="zh-CN" altLang="en-US" dirty="0"/>
+              <a:t>更改为机器的真实</a:t>
+            </a:r>
+            <a:r>
+              <a:rPr lang="en-US" altLang="zh-CN" dirty="0"/>
+              <a:t>IP</a:t>
+            </a:r>
+            <a:r>
+              <a:rPr lang="zh-CN" altLang="en-US" dirty="0"/>
+              <a:t>地址</a:t>
+            </a:r>
+            <a:endParaRPr lang="en-US" altLang="zh-CN" dirty="0"/>
+          </a:p>
+          <a:p>
+            <a:endParaRPr lang="en-US" altLang="zh-CN" dirty="0"/>
+          </a:p>
+          <a:p>
+            <a:endParaRPr lang="zh-CN" altLang="en-US" dirty="0"/>
+          </a:p>
+        </p:txBody>
+      </p:sp>
+    </p:spTree>
+    <p:extLst>
+      <p:ext uri="{BB962C8B-B14F-4D97-AF65-F5344CB8AC3E}">
+        <p14:creationId xmlns:p14="http://schemas.microsoft.com/office/powerpoint/2010/main" val="1252411289"/>
+      </p:ext>
+    </p:extLst>
+  </p:cSld>
+  <p:clrMapOvr>
+    <a:masterClrMapping/>
+  </p:clrMapOvr>
+</p:sld>
+</file>
+
+<file path=ppt/slides/slide21.xml><?xml version="1.0" encoding="utf-8"?>
 <p:sld xmlns:a="http://schemas.openxmlformats.org/drawingml/2006/main" xmlns:r="http://schemas.openxmlformats.org/officeDocument/2006/relationships" xmlns:p="http://schemas.openxmlformats.org/presentationml/2006/main">
   <p:cSld>
     <p:spTree>

</xml_diff>